<commit_message>
30/3/2022 Nguyen updated add and del fav stock in specific page
</commit_message>
<xml_diff>
--- a/Document/Review Midterm R&D/[NETCOMPANY -Trading Vision Porject]Formal Mid Review R&D.pptx
+++ b/Document/Review Midterm R&D/[NETCOMPANY -Trading Vision Porject]Formal Mid Review R&D.pptx
@@ -5,7 +5,7 @@
     <p:sldMasterId id="2147483648" r:id="rId1"/>
   </p:sldMasterIdLst>
   <p:notesMasterIdLst>
-    <p:notesMasterId r:id="rId26"/>
+    <p:notesMasterId r:id="rId27"/>
   </p:notesMasterIdLst>
   <p:sldIdLst>
     <p:sldId id="256" r:id="rId2"/>
@@ -22,41 +22,42 @@
     <p:sldId id="267" r:id="rId13"/>
     <p:sldId id="268" r:id="rId14"/>
     <p:sldId id="269" r:id="rId15"/>
-    <p:sldId id="270" r:id="rId16"/>
-    <p:sldId id="271" r:id="rId17"/>
-    <p:sldId id="272" r:id="rId18"/>
-    <p:sldId id="273" r:id="rId19"/>
-    <p:sldId id="274" r:id="rId20"/>
-    <p:sldId id="275" r:id="rId21"/>
-    <p:sldId id="276" r:id="rId22"/>
-    <p:sldId id="277" r:id="rId23"/>
-    <p:sldId id="278" r:id="rId24"/>
-    <p:sldId id="279" r:id="rId25"/>
+    <p:sldId id="280" r:id="rId16"/>
+    <p:sldId id="270" r:id="rId17"/>
+    <p:sldId id="271" r:id="rId18"/>
+    <p:sldId id="272" r:id="rId19"/>
+    <p:sldId id="273" r:id="rId20"/>
+    <p:sldId id="274" r:id="rId21"/>
+    <p:sldId id="275" r:id="rId22"/>
+    <p:sldId id="276" r:id="rId23"/>
+    <p:sldId id="277" r:id="rId24"/>
+    <p:sldId id="278" r:id="rId25"/>
+    <p:sldId id="279" r:id="rId26"/>
   </p:sldIdLst>
   <p:sldSz cx="12192000" cy="6858000"/>
   <p:notesSz cx="6858000" cy="9144000"/>
   <p:embeddedFontLst>
     <p:embeddedFont>
       <p:font typeface="Calibri" panose="020F0502020204030204" pitchFamily="34" charset="0"/>
-      <p:regular r:id="rId27"/>
-      <p:bold r:id="rId28"/>
-      <p:italic r:id="rId29"/>
-      <p:boldItalic r:id="rId30"/>
+      <p:regular r:id="rId28"/>
+      <p:bold r:id="rId29"/>
+      <p:italic r:id="rId30"/>
+      <p:boldItalic r:id="rId31"/>
     </p:embeddedFont>
     <p:embeddedFont>
       <p:font typeface="Oswald" pitchFamily="2" charset="0"/>
-      <p:regular r:id="rId31"/>
-      <p:bold r:id="rId32"/>
+      <p:regular r:id="rId32"/>
+      <p:bold r:id="rId33"/>
     </p:embeddedFont>
     <p:embeddedFont>
       <p:font typeface="Quicksand" pitchFamily="2" charset="0"/>
-      <p:regular r:id="rId33"/>
-      <p:bold r:id="rId34"/>
+      <p:regular r:id="rId34"/>
+      <p:bold r:id="rId35"/>
     </p:embeddedFont>
     <p:embeddedFont>
       <p:font typeface="Roboto Slab" pitchFamily="2" charset="0"/>
-      <p:regular r:id="rId35"/>
-      <p:bold r:id="rId36"/>
+      <p:regular r:id="rId36"/>
+      <p:bold r:id="rId37"/>
     </p:embeddedFont>
   </p:embeddedFontLst>
   <p:defaultTextStyle>
@@ -293,7 +294,7 @@
       <p15:sldGuideLst xmlns:p15="http://schemas.microsoft.com/office/powerpoint/2012/main"/>
     </p:ext>
     <p:ext uri="http://customooxmlschemas.google.com/">
-      <go:slidesCustomData xmlns:go="http://customooxmlschemas.google.com/" xmlns:ahyp="http://schemas.microsoft.com/office/drawing/2018/hyperlinkcolor" xmlns:p15="http://schemas.microsoft.com/office/powerpoint/2012/main" xmlns:p14="http://schemas.microsoft.com/office/powerpoint/2010/main" xmlns:com="http://schemas.openxmlformats.org/drawingml/2006/compatibility" xmlns:pvml="urn:schemas-microsoft-com:office:powerpoint" xmlns:v="urn:schemas-microsoft-com:vml" xmlns:o="urn:schemas-microsoft-com:office:office" xmlns:dgm="http://schemas.openxmlformats.org/drawingml/2006/diagram" xmlns:c="http://schemas.openxmlformats.org/drawingml/2006/chart" xmlns:mv="urn:schemas-microsoft-com:mac:vml" xmlns:mc="http://schemas.openxmlformats.org/markup-compatibility/2006" xmlns="" r:id="rId37" roundtripDataSignature="AMtx7miZnykcfE9/Oi+ylpB2F7Mm/j8GCg=="/>
+      <go:slidesCustomData xmlns:go="http://customooxmlschemas.google.com/" xmlns:ahyp="http://schemas.microsoft.com/office/drawing/2018/hyperlinkcolor" xmlns:p15="http://schemas.microsoft.com/office/powerpoint/2012/main" xmlns:p14="http://schemas.microsoft.com/office/powerpoint/2010/main" xmlns:com="http://schemas.openxmlformats.org/drawingml/2006/compatibility" xmlns:pvml="urn:schemas-microsoft-com:office:powerpoint" xmlns:v="urn:schemas-microsoft-com:vml" xmlns:o="urn:schemas-microsoft-com:office:office" xmlns:dgm="http://schemas.openxmlformats.org/drawingml/2006/diagram" xmlns:c="http://schemas.openxmlformats.org/drawingml/2006/chart" xmlns:mv="urn:schemas-microsoft-com:mac:vml" xmlns:mc="http://schemas.openxmlformats.org/markup-compatibility/2006" xmlns="" r:id="rId38" roundtripDataSignature="AMtx7miZnykcfE9/Oi+ylpB2F7Mm/j8GCg=="/>
     </p:ext>
   </p:extLst>
 </p:presentation>
@@ -3832,7 +3833,7 @@
             </a:pPr>
             <a:fld id="{00000000-1234-1234-1234-123412341234}" type="slidenum">
               <a:rPr lang="en-US"/>
-              <a:t>23</a:t>
+              <a:t>24</a:t>
             </a:fld>
             <a:endParaRPr/>
           </a:p>
@@ -21613,8 +21614,8 @@
         </p:nvSpPr>
         <p:spPr>
           <a:xfrm>
-            <a:off x="838200" y="300955"/>
-            <a:ext cx="10515600" cy="697500"/>
+            <a:off x="2503394" y="10490"/>
+            <a:ext cx="7185212" cy="697500"/>
           </a:xfrm>
           <a:prstGeom prst="rect">
             <a:avLst/>
@@ -21648,7 +21649,7 @@
               <a:buNone/>
             </a:pPr>
             <a:r>
-              <a:rPr lang="en-US" sz="3600" b="0" i="0" u="none" strike="noStrike" cap="none">
+              <a:rPr lang="en-US" sz="3600" b="0" i="0" u="none" strike="noStrike" cap="none" dirty="0">
                 <a:solidFill>
                   <a:schemeClr val="dk2"/>
                 </a:solidFill>
@@ -21659,7 +21660,7 @@
               </a:rPr>
               <a:t>Plan - Completed Tasks</a:t>
             </a:r>
-            <a:endParaRPr sz="1400" b="0" i="0" u="none" strike="noStrike" cap="none">
+            <a:endParaRPr sz="1400" b="0" i="0" u="none" strike="noStrike" cap="none" dirty="0">
               <a:solidFill>
                 <a:srgbClr val="000000"/>
               </a:solidFill>
@@ -21740,7 +21741,7 @@
         </p:nvCxnSpPr>
         <p:spPr>
           <a:xfrm>
-            <a:off x="4066284" y="998590"/>
+            <a:off x="4066650" y="699245"/>
             <a:ext cx="4058700" cy="0"/>
           </a:xfrm>
           <a:prstGeom prst="straightConnector1">
@@ -21908,8 +21909,8 @@
         </p:nvSpPr>
         <p:spPr>
           <a:xfrm>
-            <a:off x="3177101" y="1135838"/>
-            <a:ext cx="9207600" cy="861900"/>
+            <a:off x="3177101" y="842085"/>
+            <a:ext cx="4541511" cy="1015622"/>
           </a:xfrm>
           <a:prstGeom prst="rect">
             <a:avLst/>
@@ -21943,7 +21944,7 @@
               <a:buNone/>
             </a:pPr>
             <a:r>
-              <a:rPr lang="en-US" sz="2000" b="1">
+              <a:rPr lang="en-US" sz="2000" b="1" dirty="0">
                 <a:solidFill>
                   <a:schemeClr val="dk1"/>
                 </a:solidFill>
@@ -21951,10 +21952,11 @@
                 <a:ea typeface="Roboto Slab"/>
                 <a:cs typeface="Roboto Slab"/>
                 <a:sym typeface="Roboto Slab"/>
+                <a:hlinkClick r:id="rId5"/>
               </a:rPr>
-              <a:t>Website demo</a:t>
+              <a:t>Link: Website demo</a:t>
             </a:r>
-            <a:endParaRPr sz="2000" b="0" i="0" u="none" strike="noStrike" cap="none">
+            <a:endParaRPr sz="2000" b="0" i="0" u="none" strike="noStrike" cap="none" dirty="0">
               <a:solidFill>
                 <a:schemeClr val="dk1"/>
               </a:solidFill>
@@ -21977,7 +21979,7 @@
               </a:spcAft>
               <a:buNone/>
             </a:pPr>
-            <a:endParaRPr sz="2000">
+            <a:endParaRPr sz="2000" dirty="0">
               <a:solidFill>
                 <a:schemeClr val="dk1"/>
               </a:solidFill>
@@ -22007,15 +22009,15 @@
           </p:nvPr>
         </p:nvPicPr>
         <p:blipFill>
-          <a:blip r:embed="rId5"/>
+          <a:blip r:embed="rId6"/>
           <a:stretch>
             <a:fillRect/>
           </a:stretch>
         </p:blipFill>
         <p:spPr>
           <a:xfrm>
-            <a:off x="1402976" y="1151000"/>
-            <a:ext cx="9592892" cy="5419984"/>
+            <a:off x="1404038" y="1349896"/>
+            <a:ext cx="9383923" cy="5301916"/>
           </a:xfrm>
           <a:prstGeom prst="rect">
             <a:avLst/>
@@ -22276,6 +22278,124 @@
   <p:cSld>
     <p:spTree>
       <p:nvGrpSpPr>
+        <p:cNvPr id="1" name=""/>
+        <p:cNvGrpSpPr/>
+        <p:nvPr/>
+      </p:nvGrpSpPr>
+      <p:grpSpPr>
+        <a:xfrm>
+          <a:off x="0" y="0"/>
+          <a:ext cx="0" cy="0"/>
+          <a:chOff x="0" y="0"/>
+          <a:chExt cx="0" cy="0"/>
+        </a:xfrm>
+      </p:grpSpPr>
+      <p:sp>
+        <p:nvSpPr>
+          <p:cNvPr id="2" name="Title 1">
+            <a:extLst>
+              <a:ext uri="{FF2B5EF4-FFF2-40B4-BE49-F238E27FC236}">
+                <a16:creationId xmlns:a16="http://schemas.microsoft.com/office/drawing/2014/main" id="{EE77A4B2-CE92-4540-B660-1C1C8AE9DCCD}"/>
+              </a:ext>
+            </a:extLst>
+          </p:cNvPr>
+          <p:cNvSpPr>
+            <a:spLocks noGrp="1"/>
+          </p:cNvSpPr>
+          <p:nvPr>
+            <p:ph type="title"/>
+          </p:nvPr>
+        </p:nvSpPr>
+        <p:spPr/>
+        <p:txBody>
+          <a:bodyPr/>
+          <a:lstStyle/>
+          <a:p>
+            <a:endParaRPr lang="en-US"/>
+          </a:p>
+        </p:txBody>
+      </p:sp>
+      <p:sp>
+        <p:nvSpPr>
+          <p:cNvPr id="3" name="Text Placeholder 2">
+            <a:extLst>
+              <a:ext uri="{FF2B5EF4-FFF2-40B4-BE49-F238E27FC236}">
+                <a16:creationId xmlns:a16="http://schemas.microsoft.com/office/drawing/2014/main" id="{BAE4E76B-161A-43F9-8E76-68CC0057F939}"/>
+              </a:ext>
+            </a:extLst>
+          </p:cNvPr>
+          <p:cNvSpPr>
+            <a:spLocks noGrp="1"/>
+          </p:cNvSpPr>
+          <p:nvPr>
+            <p:ph type="body" idx="1"/>
+          </p:nvPr>
+        </p:nvSpPr>
+        <p:spPr/>
+        <p:txBody>
+          <a:bodyPr/>
+          <a:lstStyle/>
+          <a:p>
+            <a:endParaRPr lang="en-US"/>
+          </a:p>
+        </p:txBody>
+      </p:sp>
+      <p:sp>
+        <p:nvSpPr>
+          <p:cNvPr id="4" name="Slide Number Placeholder 3">
+            <a:extLst>
+              <a:ext uri="{FF2B5EF4-FFF2-40B4-BE49-F238E27FC236}">
+                <a16:creationId xmlns:a16="http://schemas.microsoft.com/office/drawing/2014/main" id="{39021640-928D-434D-A62F-66E77F3975DF}"/>
+              </a:ext>
+            </a:extLst>
+          </p:cNvPr>
+          <p:cNvSpPr>
+            <a:spLocks noGrp="1"/>
+          </p:cNvSpPr>
+          <p:nvPr>
+            <p:ph type="sldNum" idx="12"/>
+          </p:nvPr>
+        </p:nvSpPr>
+        <p:spPr/>
+        <p:txBody>
+          <a:bodyPr/>
+          <a:lstStyle/>
+          <a:p>
+            <a:pPr marL="0" lvl="0" indent="0" algn="r" rtl="0">
+              <a:spcBef>
+                <a:spcPts val="0"/>
+              </a:spcBef>
+              <a:spcAft>
+                <a:spcPts val="0"/>
+              </a:spcAft>
+              <a:buNone/>
+            </a:pPr>
+            <a:fld id="{00000000-1234-1234-1234-123412341234}" type="slidenum">
+              <a:rPr lang="en-US" smtClean="0"/>
+              <a:t>15</a:t>
+            </a:fld>
+            <a:endParaRPr lang="en-US"/>
+          </a:p>
+        </p:txBody>
+      </p:sp>
+    </p:spTree>
+    <p:extLst>
+      <p:ext uri="{BB962C8B-B14F-4D97-AF65-F5344CB8AC3E}">
+        <p14:creationId xmlns:p14="http://schemas.microsoft.com/office/powerpoint/2010/main" val="3725176909"/>
+      </p:ext>
+    </p:extLst>
+  </p:cSld>
+  <p:clrMapOvr>
+    <a:masterClrMapping/>
+  </p:clrMapOvr>
+</p:sld>
+</file>
+
+<file path=ppt/slides/slide16.xml><?xml version="1.0" encoding="utf-8"?>
+<p:sld xmlns:a="http://schemas.openxmlformats.org/drawingml/2006/main" xmlns:r="http://schemas.openxmlformats.org/officeDocument/2006/relationships" xmlns:p="http://schemas.openxmlformats.org/presentationml/2006/main">
+  <p:cSld>
+    <p:spTree>
+      <p:nvGrpSpPr>
         <p:cNvPr id="1" name="Shape 257"/>
         <p:cNvGrpSpPr/>
         <p:nvPr/>
@@ -22824,7 +22944,7 @@
 </p:sld>
 </file>
 
-<file path=ppt/slides/slide16.xml><?xml version="1.0" encoding="utf-8"?>
+<file path=ppt/slides/slide17.xml><?xml version="1.0" encoding="utf-8"?>
 <p:sld xmlns:a="http://schemas.openxmlformats.org/drawingml/2006/main" xmlns:r="http://schemas.openxmlformats.org/officeDocument/2006/relationships" xmlns:p="http://schemas.openxmlformats.org/presentationml/2006/main">
   <p:cSld>
     <p:spTree>
@@ -23273,7 +23393,7 @@
 </p:sld>
 </file>
 
-<file path=ppt/slides/slide17.xml><?xml version="1.0" encoding="utf-8"?>
+<file path=ppt/slides/slide18.xml><?xml version="1.0" encoding="utf-8"?>
 <p:sld xmlns:a="http://schemas.openxmlformats.org/drawingml/2006/main" xmlns:r="http://schemas.openxmlformats.org/officeDocument/2006/relationships" xmlns:p="http://schemas.openxmlformats.org/presentationml/2006/main">
   <p:cSld>
     <p:spTree>
@@ -24098,7 +24218,7 @@
 </p:sld>
 </file>
 
-<file path=ppt/slides/slide18.xml><?xml version="1.0" encoding="utf-8"?>
+<file path=ppt/slides/slide19.xml><?xml version="1.0" encoding="utf-8"?>
 <p:sld xmlns:a="http://schemas.openxmlformats.org/drawingml/2006/main" xmlns:r="http://schemas.openxmlformats.org/officeDocument/2006/relationships" xmlns:p="http://schemas.openxmlformats.org/presentationml/2006/main">
   <p:cSld>
     <p:spTree>
@@ -24470,809 +24590,6 @@
   <p:clrMapOvr>
     <a:masterClrMapping/>
   </p:clrMapOvr>
-</p:sld>
-</file>
-
-<file path=ppt/slides/slide19.xml><?xml version="1.0" encoding="utf-8"?>
-<p:sld xmlns:a="http://schemas.openxmlformats.org/drawingml/2006/main" xmlns:r="http://schemas.openxmlformats.org/officeDocument/2006/relationships" xmlns:p="http://schemas.openxmlformats.org/presentationml/2006/main">
-  <p:cSld>
-    <p:spTree>
-      <p:nvGrpSpPr>
-        <p:cNvPr id="1" name="Shape 300"/>
-        <p:cNvGrpSpPr/>
-        <p:nvPr/>
-      </p:nvGrpSpPr>
-      <p:grpSpPr>
-        <a:xfrm>
-          <a:off x="0" y="0"/>
-          <a:ext cx="0" cy="0"/>
-          <a:chOff x="0" y="0"/>
-          <a:chExt cx="0" cy="0"/>
-        </a:xfrm>
-      </p:grpSpPr>
-      <p:sp>
-        <p:nvSpPr>
-          <p:cNvPr id="301" name="Google Shape;301;g110466c95e2_8_150"/>
-          <p:cNvSpPr txBox="1"/>
-          <p:nvPr/>
-        </p:nvSpPr>
-        <p:spPr>
-          <a:xfrm>
-            <a:off x="2920650" y="1564200"/>
-            <a:ext cx="8412900" cy="4186800"/>
-          </a:xfrm>
-          <a:prstGeom prst="rect">
-            <a:avLst/>
-          </a:prstGeom>
-          <a:noFill/>
-          <a:ln>
-            <a:noFill/>
-          </a:ln>
-        </p:spPr>
-        <p:txBody>
-          <a:bodyPr spcFirstLastPara="1" wrap="square" lIns="91425" tIns="91425" rIns="91425" bIns="91425" anchor="t" anchorCtr="0">
-            <a:spAutoFit/>
-          </a:bodyPr>
-          <a:lstStyle/>
-          <a:p>
-            <a:pPr marL="0" marR="0" lvl="0" indent="0" algn="just" rtl="0">
-              <a:lnSpc>
-                <a:spcPct val="150000"/>
-              </a:lnSpc>
-              <a:spcBef>
-                <a:spcPts val="0"/>
-              </a:spcBef>
-              <a:spcAft>
-                <a:spcPts val="0"/>
-              </a:spcAft>
-              <a:buClr>
-                <a:srgbClr val="000000"/>
-              </a:buClr>
-              <a:buSzPts val="2000"/>
-              <a:buFont typeface="Arial"/>
-              <a:buNone/>
-            </a:pPr>
-            <a:r>
-              <a:rPr lang="en-US" sz="2000" b="0" i="0" u="none" strike="noStrike" cap="none">
-                <a:solidFill>
-                  <a:schemeClr val="dk1"/>
-                </a:solidFill>
-                <a:latin typeface="Roboto Slab"/>
-                <a:ea typeface="Roboto Slab"/>
-                <a:cs typeface="Roboto Slab"/>
-                <a:sym typeface="Roboto Slab"/>
-              </a:rPr>
-              <a:t>Up to now, we have:</a:t>
-            </a:r>
-            <a:endParaRPr sz="2000" b="0" i="0" u="none" strike="noStrike" cap="none">
-              <a:solidFill>
-                <a:schemeClr val="dk1"/>
-              </a:solidFill>
-              <a:latin typeface="Roboto Slab"/>
-              <a:ea typeface="Roboto Slab"/>
-              <a:cs typeface="Roboto Slab"/>
-              <a:sym typeface="Roboto Slab"/>
-            </a:endParaRPr>
-          </a:p>
-          <a:p>
-            <a:pPr marL="457200" marR="0" lvl="0" indent="-355600" algn="just" rtl="0">
-              <a:lnSpc>
-                <a:spcPct val="150000"/>
-              </a:lnSpc>
-              <a:spcBef>
-                <a:spcPts val="0"/>
-              </a:spcBef>
-              <a:spcAft>
-                <a:spcPts val="0"/>
-              </a:spcAft>
-              <a:buClr>
-                <a:schemeClr val="dk1"/>
-              </a:buClr>
-              <a:buSzPts val="2000"/>
-              <a:buFont typeface="Roboto Slab"/>
-              <a:buChar char="★"/>
-            </a:pPr>
-            <a:r>
-              <a:rPr lang="en-US" sz="2000" b="0" i="0" u="none" strike="noStrike" cap="none">
-                <a:solidFill>
-                  <a:schemeClr val="dk1"/>
-                </a:solidFill>
-                <a:latin typeface="Roboto Slab"/>
-                <a:ea typeface="Roboto Slab"/>
-                <a:cs typeface="Roboto Slab"/>
-                <a:sym typeface="Roboto Slab"/>
-              </a:rPr>
-              <a:t>Completed compulsory documents.</a:t>
-            </a:r>
-            <a:endParaRPr sz="2000" b="0" i="0" u="none" strike="noStrike" cap="none">
-              <a:solidFill>
-                <a:schemeClr val="dk1"/>
-              </a:solidFill>
-              <a:latin typeface="Roboto Slab"/>
-              <a:ea typeface="Roboto Slab"/>
-              <a:cs typeface="Roboto Slab"/>
-              <a:sym typeface="Roboto Slab"/>
-            </a:endParaRPr>
-          </a:p>
-          <a:p>
-            <a:pPr marL="457200" marR="0" lvl="0" indent="-355600" algn="just" rtl="0">
-              <a:lnSpc>
-                <a:spcPct val="150000"/>
-              </a:lnSpc>
-              <a:spcBef>
-                <a:spcPts val="0"/>
-              </a:spcBef>
-              <a:spcAft>
-                <a:spcPts val="0"/>
-              </a:spcAft>
-              <a:buClr>
-                <a:schemeClr val="dk1"/>
-              </a:buClr>
-              <a:buSzPts val="2000"/>
-              <a:buFont typeface="Roboto Slab"/>
-              <a:buChar char="★"/>
-            </a:pPr>
-            <a:r>
-              <a:rPr lang="en-US" sz="2000" b="0" i="0" u="none" strike="noStrike" cap="none">
-                <a:solidFill>
-                  <a:schemeClr val="dk1"/>
-                </a:solidFill>
-                <a:latin typeface="Roboto Slab"/>
-                <a:ea typeface="Roboto Slab"/>
-                <a:cs typeface="Roboto Slab"/>
-                <a:sym typeface="Roboto Slab"/>
-              </a:rPr>
-              <a:t>Stock prediction algorithm - LSTM.</a:t>
-            </a:r>
-            <a:endParaRPr sz="2000" b="0" i="0" u="none" strike="noStrike" cap="none">
-              <a:solidFill>
-                <a:schemeClr val="dk1"/>
-              </a:solidFill>
-              <a:latin typeface="Roboto Slab"/>
-              <a:ea typeface="Roboto Slab"/>
-              <a:cs typeface="Roboto Slab"/>
-              <a:sym typeface="Roboto Slab"/>
-            </a:endParaRPr>
-          </a:p>
-          <a:p>
-            <a:pPr marL="457200" marR="0" lvl="0" indent="-355600" algn="just" rtl="0">
-              <a:lnSpc>
-                <a:spcPct val="150000"/>
-              </a:lnSpc>
-              <a:spcBef>
-                <a:spcPts val="0"/>
-              </a:spcBef>
-              <a:spcAft>
-                <a:spcPts val="0"/>
-              </a:spcAft>
-              <a:buClr>
-                <a:schemeClr val="dk1"/>
-              </a:buClr>
-              <a:buSzPts val="2000"/>
-              <a:buFont typeface="Roboto Slab"/>
-              <a:buChar char="★"/>
-            </a:pPr>
-            <a:r>
-              <a:rPr lang="en-US" sz="2000" b="0" i="0" u="none" strike="noStrike" cap="none">
-                <a:solidFill>
-                  <a:schemeClr val="dk1"/>
-                </a:solidFill>
-                <a:latin typeface="Roboto Slab"/>
-                <a:ea typeface="Roboto Slab"/>
-                <a:cs typeface="Roboto Slab"/>
-                <a:sym typeface="Roboto Slab"/>
-              </a:rPr>
-              <a:t>Data to train our model, to display charts and other information in the User Interface.</a:t>
-            </a:r>
-            <a:endParaRPr sz="2000" b="0" i="0" u="none" strike="noStrike" cap="none">
-              <a:solidFill>
-                <a:schemeClr val="dk1"/>
-              </a:solidFill>
-              <a:latin typeface="Roboto Slab"/>
-              <a:ea typeface="Roboto Slab"/>
-              <a:cs typeface="Roboto Slab"/>
-              <a:sym typeface="Roboto Slab"/>
-            </a:endParaRPr>
-          </a:p>
-          <a:p>
-            <a:pPr marL="457200" marR="0" lvl="0" indent="-355600" algn="just" rtl="0">
-              <a:lnSpc>
-                <a:spcPct val="150000"/>
-              </a:lnSpc>
-              <a:spcBef>
-                <a:spcPts val="0"/>
-              </a:spcBef>
-              <a:spcAft>
-                <a:spcPts val="0"/>
-              </a:spcAft>
-              <a:buClr>
-                <a:schemeClr val="dk1"/>
-              </a:buClr>
-              <a:buSzPts val="2000"/>
-              <a:buFont typeface="Roboto Slab"/>
-              <a:buChar char="★"/>
-            </a:pPr>
-            <a:r>
-              <a:rPr lang="en-US" sz="2000" b="0" i="0" u="none" strike="noStrike" cap="none">
-                <a:solidFill>
-                  <a:schemeClr val="dk1"/>
-                </a:solidFill>
-                <a:latin typeface="Roboto Slab"/>
-                <a:ea typeface="Roboto Slab"/>
-                <a:cs typeface="Roboto Slab"/>
-                <a:sym typeface="Roboto Slab"/>
-              </a:rPr>
-              <a:t>MongoDB to store all necessary data.</a:t>
-            </a:r>
-            <a:endParaRPr sz="2000" b="0" i="0" u="none" strike="noStrike" cap="none">
-              <a:solidFill>
-                <a:schemeClr val="dk1"/>
-              </a:solidFill>
-              <a:latin typeface="Roboto Slab"/>
-              <a:ea typeface="Roboto Slab"/>
-              <a:cs typeface="Roboto Slab"/>
-              <a:sym typeface="Roboto Slab"/>
-            </a:endParaRPr>
-          </a:p>
-          <a:p>
-            <a:pPr marL="457200" marR="0" lvl="0" indent="-355600" algn="just" rtl="0">
-              <a:lnSpc>
-                <a:spcPct val="150000"/>
-              </a:lnSpc>
-              <a:spcBef>
-                <a:spcPts val="0"/>
-              </a:spcBef>
-              <a:spcAft>
-                <a:spcPts val="0"/>
-              </a:spcAft>
-              <a:buClr>
-                <a:schemeClr val="dk1"/>
-              </a:buClr>
-              <a:buSzPts val="2000"/>
-              <a:buFont typeface="Roboto Slab"/>
-              <a:buChar char="★"/>
-            </a:pPr>
-            <a:r>
-              <a:rPr lang="en-US" sz="2000" b="0" i="0" u="none" strike="noStrike" cap="none">
-                <a:solidFill>
-                  <a:schemeClr val="dk1"/>
-                </a:solidFill>
-                <a:latin typeface="Roboto Slab"/>
-                <a:ea typeface="Roboto Slab"/>
-                <a:cs typeface="Roboto Slab"/>
-                <a:sym typeface="Roboto Slab"/>
-              </a:rPr>
-              <a:t>A</a:t>
-            </a:r>
-            <a:r>
-              <a:rPr lang="en-US" sz="2000">
-                <a:solidFill>
-                  <a:schemeClr val="dk1"/>
-                </a:solidFill>
-                <a:latin typeface="Roboto Slab"/>
-                <a:ea typeface="Roboto Slab"/>
-                <a:cs typeface="Roboto Slab"/>
-                <a:sym typeface="Roboto Slab"/>
-              </a:rPr>
-              <a:t> website for users to login, add reminder and favorite stock, see stock information, its candlestick chart and predicting line chart, have a comparison with another stock.</a:t>
-            </a:r>
-            <a:endParaRPr sz="2000" b="0" i="0" u="none" strike="noStrike" cap="none">
-              <a:solidFill>
-                <a:schemeClr val="dk1"/>
-              </a:solidFill>
-              <a:latin typeface="Roboto Slab"/>
-              <a:ea typeface="Roboto Slab"/>
-              <a:cs typeface="Roboto Slab"/>
-              <a:sym typeface="Roboto Slab"/>
-            </a:endParaRPr>
-          </a:p>
-        </p:txBody>
-      </p:sp>
-      <p:sp>
-        <p:nvSpPr>
-          <p:cNvPr id="302" name="Google Shape;302;g110466c95e2_8_150"/>
-          <p:cNvSpPr txBox="1"/>
-          <p:nvPr/>
-        </p:nvSpPr>
-        <p:spPr>
-          <a:xfrm>
-            <a:off x="838200" y="300955"/>
-            <a:ext cx="10515600" cy="697500"/>
-          </a:xfrm>
-          <a:prstGeom prst="rect">
-            <a:avLst/>
-          </a:prstGeom>
-          <a:noFill/>
-          <a:ln>
-            <a:noFill/>
-          </a:ln>
-        </p:spPr>
-        <p:txBody>
-          <a:bodyPr spcFirstLastPara="1" wrap="square" lIns="91425" tIns="45700" rIns="91425" bIns="45700" anchor="b" anchorCtr="0">
-            <a:normAutofit/>
-          </a:bodyPr>
-          <a:lstStyle/>
-          <a:p>
-            <a:pPr marL="0" marR="0" lvl="0" indent="0" algn="ctr" rtl="0">
-              <a:lnSpc>
-                <a:spcPct val="90000"/>
-              </a:lnSpc>
-              <a:spcBef>
-                <a:spcPts val="0"/>
-              </a:spcBef>
-              <a:spcAft>
-                <a:spcPts val="0"/>
-              </a:spcAft>
-              <a:buClr>
-                <a:schemeClr val="dk2"/>
-              </a:buClr>
-              <a:buSzPts val="3600"/>
-              <a:buFont typeface="Oswald"/>
-              <a:buNone/>
-            </a:pPr>
-            <a:r>
-              <a:rPr lang="en-US" sz="3600" b="0" i="0" u="none" strike="noStrike" cap="none">
-                <a:solidFill>
-                  <a:schemeClr val="dk2"/>
-                </a:solidFill>
-                <a:latin typeface="Oswald"/>
-                <a:ea typeface="Oswald"/>
-                <a:cs typeface="Oswald"/>
-                <a:sym typeface="Oswald"/>
-              </a:rPr>
-              <a:t>Evaluation</a:t>
-            </a:r>
-            <a:endParaRPr sz="1400" b="0" i="0" u="none" strike="noStrike" cap="none">
-              <a:solidFill>
-                <a:srgbClr val="000000"/>
-              </a:solidFill>
-              <a:latin typeface="Arial"/>
-              <a:ea typeface="Arial"/>
-              <a:cs typeface="Arial"/>
-              <a:sym typeface="Arial"/>
-            </a:endParaRPr>
-          </a:p>
-        </p:txBody>
-      </p:sp>
-      <p:sp>
-        <p:nvSpPr>
-          <p:cNvPr id="303" name="Google Shape;303;g110466c95e2_8_150"/>
-          <p:cNvSpPr/>
-          <p:nvPr/>
-        </p:nvSpPr>
-        <p:spPr>
-          <a:xfrm>
-            <a:off x="0" y="6723529"/>
-            <a:ext cx="12192000" cy="147900"/>
-          </a:xfrm>
-          <a:prstGeom prst="rect">
-            <a:avLst/>
-          </a:prstGeom>
-          <a:blipFill rotWithShape="1">
-            <a:blip r:embed="rId3">
-              <a:alphaModFix/>
-            </a:blip>
-            <a:stretch>
-              <a:fillRect/>
-            </a:stretch>
-          </a:blipFill>
-          <a:ln>
-            <a:noFill/>
-          </a:ln>
-        </p:spPr>
-        <p:txBody>
-          <a:bodyPr spcFirstLastPara="1" wrap="square" lIns="91425" tIns="45700" rIns="91425" bIns="45700" anchor="ctr" anchorCtr="0">
-            <a:noAutofit/>
-          </a:bodyPr>
-          <a:lstStyle/>
-          <a:p>
-            <a:pPr marL="0" marR="0" lvl="0" indent="0" algn="ctr" rtl="0">
-              <a:lnSpc>
-                <a:spcPct val="100000"/>
-              </a:lnSpc>
-              <a:spcBef>
-                <a:spcPts val="0"/>
-              </a:spcBef>
-              <a:spcAft>
-                <a:spcPts val="0"/>
-              </a:spcAft>
-              <a:buClr>
-                <a:srgbClr val="000000"/>
-              </a:buClr>
-              <a:buSzPts val="1800"/>
-              <a:buFont typeface="Arial"/>
-              <a:buNone/>
-            </a:pPr>
-            <a:endParaRPr sz="1800" b="0" i="0" u="none" strike="noStrike" cap="none">
-              <a:solidFill>
-                <a:schemeClr val="lt1"/>
-              </a:solidFill>
-              <a:latin typeface="Calibri"/>
-              <a:ea typeface="Calibri"/>
-              <a:cs typeface="Calibri"/>
-              <a:sym typeface="Calibri"/>
-            </a:endParaRPr>
-          </a:p>
-        </p:txBody>
-      </p:sp>
-      <p:cxnSp>
-        <p:nvCxnSpPr>
-          <p:cNvPr id="304" name="Google Shape;304;g110466c95e2_8_150"/>
-          <p:cNvCxnSpPr/>
-          <p:nvPr/>
-        </p:nvCxnSpPr>
-        <p:spPr>
-          <a:xfrm>
-            <a:off x="4066284" y="998590"/>
-            <a:ext cx="4058700" cy="0"/>
-          </a:xfrm>
-          <a:prstGeom prst="straightConnector1">
-            <a:avLst/>
-          </a:prstGeom>
-          <a:noFill/>
-          <a:ln w="28575" cap="flat" cmpd="sng">
-            <a:solidFill>
-              <a:srgbClr val="0081AB"/>
-            </a:solidFill>
-            <a:prstDash val="solid"/>
-            <a:miter lim="800000"/>
-            <a:headEnd type="none" w="sm" len="sm"/>
-            <a:tailEnd type="none" w="sm" len="sm"/>
-          </a:ln>
-        </p:spPr>
-      </p:cxnSp>
-      <p:sp>
-        <p:nvSpPr>
-          <p:cNvPr id="305" name="Google Shape;305;g110466c95e2_8_150"/>
-          <p:cNvSpPr/>
-          <p:nvPr/>
-        </p:nvSpPr>
-        <p:spPr>
-          <a:xfrm>
-            <a:off x="11436822" y="324793"/>
-            <a:ext cx="477300" cy="328200"/>
-          </a:xfrm>
-          <a:prstGeom prst="roundRect">
-            <a:avLst>
-              <a:gd name="adj" fmla="val 16667"/>
-            </a:avLst>
-          </a:prstGeom>
-          <a:solidFill>
-            <a:schemeClr val="lt2"/>
-          </a:solidFill>
-          <a:ln w="38100" cap="flat" cmpd="sng">
-            <a:solidFill>
-              <a:srgbClr val="D5DBE5"/>
-            </a:solidFill>
-            <a:prstDash val="solid"/>
-            <a:miter lim="800000"/>
-            <a:headEnd type="none" w="sm" len="sm"/>
-            <a:tailEnd type="none" w="sm" len="sm"/>
-          </a:ln>
-        </p:spPr>
-        <p:txBody>
-          <a:bodyPr spcFirstLastPara="1" wrap="square" lIns="91425" tIns="45700" rIns="91425" bIns="45700" anchor="ctr" anchorCtr="0">
-            <a:noAutofit/>
-          </a:bodyPr>
-          <a:lstStyle/>
-          <a:p>
-            <a:pPr marL="0" marR="0" lvl="0" indent="0" algn="ctr" rtl="0">
-              <a:lnSpc>
-                <a:spcPct val="100000"/>
-              </a:lnSpc>
-              <a:spcBef>
-                <a:spcPts val="0"/>
-              </a:spcBef>
-              <a:spcAft>
-                <a:spcPts val="0"/>
-              </a:spcAft>
-              <a:buClr>
-                <a:schemeClr val="lt1"/>
-              </a:buClr>
-              <a:buSzPts val="1200"/>
-              <a:buFont typeface="Calibri"/>
-              <a:buNone/>
-            </a:pPr>
-            <a:endParaRPr sz="1200" b="0" i="0" u="none" strike="noStrike" cap="none">
-              <a:solidFill>
-                <a:schemeClr val="lt1"/>
-              </a:solidFill>
-              <a:latin typeface="Calibri"/>
-              <a:ea typeface="Calibri"/>
-              <a:cs typeface="Calibri"/>
-              <a:sym typeface="Calibri"/>
-            </a:endParaRPr>
-          </a:p>
-        </p:txBody>
-      </p:sp>
-      <p:sp>
-        <p:nvSpPr>
-          <p:cNvPr id="306" name="Google Shape;306;g110466c95e2_8_150"/>
-          <p:cNvSpPr txBox="1"/>
-          <p:nvPr/>
-        </p:nvSpPr>
-        <p:spPr>
-          <a:xfrm>
-            <a:off x="11333546" y="306325"/>
-            <a:ext cx="543600" cy="365100"/>
-          </a:xfrm>
-          <a:prstGeom prst="rect">
-            <a:avLst/>
-          </a:prstGeom>
-          <a:noFill/>
-          <a:ln>
-            <a:noFill/>
-          </a:ln>
-        </p:spPr>
-        <p:txBody>
-          <a:bodyPr spcFirstLastPara="1" wrap="square" lIns="91425" tIns="45700" rIns="91425" bIns="45700" anchor="ctr" anchorCtr="0">
-            <a:noAutofit/>
-          </a:bodyPr>
-          <a:lstStyle/>
-          <a:p>
-            <a:pPr marL="0" marR="0" lvl="0" indent="0" algn="r" rtl="0">
-              <a:lnSpc>
-                <a:spcPct val="100000"/>
-              </a:lnSpc>
-              <a:spcBef>
-                <a:spcPts val="0"/>
-              </a:spcBef>
-              <a:spcAft>
-                <a:spcPts val="0"/>
-              </a:spcAft>
-              <a:buClr>
-                <a:srgbClr val="000000"/>
-              </a:buClr>
-              <a:buSzPts val="1500"/>
-              <a:buFont typeface="Arial"/>
-              <a:buNone/>
-            </a:pPr>
-            <a:r>
-              <a:rPr lang="en-US" sz="1500" b="1">
-                <a:solidFill>
-                  <a:srgbClr val="003A5F"/>
-                </a:solidFill>
-                <a:latin typeface="Roboto Slab"/>
-                <a:ea typeface="Roboto Slab"/>
-                <a:cs typeface="Roboto Slab"/>
-                <a:sym typeface="Roboto Slab"/>
-              </a:rPr>
-              <a:t>17</a:t>
-            </a:r>
-            <a:endParaRPr sz="1500" b="1" i="0" u="none" strike="noStrike" cap="none">
-              <a:solidFill>
-                <a:srgbClr val="003A5F"/>
-              </a:solidFill>
-              <a:latin typeface="Roboto Slab"/>
-              <a:ea typeface="Roboto Slab"/>
-              <a:cs typeface="Roboto Slab"/>
-              <a:sym typeface="Roboto Slab"/>
-            </a:endParaRPr>
-          </a:p>
-        </p:txBody>
-      </p:sp>
-      <p:pic>
-        <p:nvPicPr>
-          <p:cNvPr id="307" name="Google Shape;307;g110466c95e2_8_150"/>
-          <p:cNvPicPr preferRelativeResize="0"/>
-          <p:nvPr/>
-        </p:nvPicPr>
-        <p:blipFill rotWithShape="1">
-          <a:blip r:embed="rId4">
-            <a:alphaModFix/>
-          </a:blip>
-          <a:srcRect/>
-          <a:stretch/>
-        </p:blipFill>
-        <p:spPr>
-          <a:xfrm>
-            <a:off x="1229575" y="1797000"/>
-            <a:ext cx="1446400" cy="1446400"/>
-          </a:xfrm>
-          <a:prstGeom prst="rect">
-            <a:avLst/>
-          </a:prstGeom>
-          <a:noFill/>
-          <a:ln>
-            <a:noFill/>
-          </a:ln>
-        </p:spPr>
-      </p:pic>
-      <p:sp>
-        <p:nvSpPr>
-          <p:cNvPr id="308" name="Google Shape;308;g110466c95e2_8_150"/>
-          <p:cNvSpPr txBox="1"/>
-          <p:nvPr/>
-        </p:nvSpPr>
-        <p:spPr>
-          <a:xfrm>
-            <a:off x="2991525" y="1977500"/>
-            <a:ext cx="7996500" cy="400200"/>
-          </a:xfrm>
-          <a:prstGeom prst="rect">
-            <a:avLst/>
-          </a:prstGeom>
-          <a:noFill/>
-          <a:ln>
-            <a:noFill/>
-          </a:ln>
-        </p:spPr>
-        <p:txBody>
-          <a:bodyPr spcFirstLastPara="1" wrap="square" lIns="91425" tIns="91425" rIns="91425" bIns="91425" anchor="t" anchorCtr="0">
-            <a:spAutoFit/>
-          </a:bodyPr>
-          <a:lstStyle/>
-          <a:p>
-            <a:pPr marL="0" marR="0" lvl="0" indent="0" algn="l" rtl="0">
-              <a:lnSpc>
-                <a:spcPct val="100000"/>
-              </a:lnSpc>
-              <a:spcBef>
-                <a:spcPts val="0"/>
-              </a:spcBef>
-              <a:spcAft>
-                <a:spcPts val="0"/>
-              </a:spcAft>
-              <a:buClr>
-                <a:srgbClr val="000000"/>
-              </a:buClr>
-              <a:buSzPts val="1400"/>
-              <a:buFont typeface="Arial"/>
-              <a:buNone/>
-            </a:pPr>
-            <a:endParaRPr sz="1400" b="0" i="0" u="none" strike="noStrike" cap="none">
-              <a:solidFill>
-                <a:srgbClr val="000000"/>
-              </a:solidFill>
-              <a:latin typeface="Calibri"/>
-              <a:ea typeface="Calibri"/>
-              <a:cs typeface="Calibri"/>
-              <a:sym typeface="Calibri"/>
-            </a:endParaRPr>
-          </a:p>
-        </p:txBody>
-      </p:sp>
-    </p:spTree>
-  </p:cSld>
-  <p:clrMapOvr>
-    <a:masterClrMapping/>
-  </p:clrMapOvr>
-  <p:timing>
-    <p:tnLst>
-      <p:par>
-        <p:cTn id="1" dur="indefinite" restart="never" nodeType="tmRoot">
-          <p:childTnLst>
-            <p:seq concurrent="1" nextAc="seek">
-              <p:cTn id="2" dur="indefinite" nodeType="mainSeq">
-                <p:childTnLst>
-                  <p:par>
-                    <p:cTn id="3" fill="hold">
-                      <p:stCondLst>
-                        <p:cond delay="indefinite"/>
-                        <p:cond evt="onBegin" delay="0">
-                          <p:tn val="2"/>
-                        </p:cond>
-                      </p:stCondLst>
-                      <p:childTnLst>
-                        <p:par>
-                          <p:cTn id="4" fill="hold">
-                            <p:stCondLst>
-                              <p:cond delay="0"/>
-                            </p:stCondLst>
-                            <p:childTnLst>
-                              <p:par>
-                                <p:cTn id="5" presetID="10" presetClass="entr" presetSubtype="0" fill="hold" nodeType="withEffect">
-                                  <p:stCondLst>
-                                    <p:cond delay="0"/>
-                                  </p:stCondLst>
-                                  <p:childTnLst>
-                                    <p:set>
-                                      <p:cBhvr>
-                                        <p:cTn id="6" dur="1" fill="hold">
-                                          <p:stCondLst>
-                                            <p:cond delay="0"/>
-                                          </p:stCondLst>
-                                        </p:cTn>
-                                        <p:tgtEl>
-                                          <p:spTgt spid="302"/>
-                                        </p:tgtEl>
-                                        <p:attrNameLst>
-                                          <p:attrName>style.visibility</p:attrName>
-                                        </p:attrNameLst>
-                                      </p:cBhvr>
-                                      <p:to>
-                                        <p:strVal val="visible"/>
-                                      </p:to>
-                                    </p:set>
-                                    <p:animEffect transition="in" filter="fade">
-                                      <p:cBhvr>
-                                        <p:cTn id="7" dur="1700"/>
-                                        <p:tgtEl>
-                                          <p:spTgt spid="302"/>
-                                        </p:tgtEl>
-                                      </p:cBhvr>
-                                    </p:animEffect>
-                                  </p:childTnLst>
-                                </p:cTn>
-                              </p:par>
-                              <p:par>
-                                <p:cTn id="8" presetID="2" presetClass="entr" presetSubtype="2" fill="hold" nodeType="withEffect">
-                                  <p:stCondLst>
-                                    <p:cond delay="0"/>
-                                  </p:stCondLst>
-                                  <p:childTnLst>
-                                    <p:set>
-                                      <p:cBhvr>
-                                        <p:cTn id="9" dur="1" fill="hold">
-                                          <p:stCondLst>
-                                            <p:cond delay="0"/>
-                                          </p:stCondLst>
-                                        </p:cTn>
-                                        <p:tgtEl>
-                                          <p:spTgt spid="304"/>
-                                        </p:tgtEl>
-                                        <p:attrNameLst>
-                                          <p:attrName>style.visibility</p:attrName>
-                                        </p:attrNameLst>
-                                      </p:cBhvr>
-                                      <p:to>
-                                        <p:strVal val="visible"/>
-                                      </p:to>
-                                    </p:set>
-                                    <p:anim calcmode="lin" valueType="num">
-                                      <p:cBhvr additive="base">
-                                        <p:cTn id="10" dur="500"/>
-                                        <p:tgtEl>
-                                          <p:spTgt spid="304"/>
-                                        </p:tgtEl>
-                                        <p:attrNameLst>
-                                          <p:attrName>ppt_x</p:attrName>
-                                        </p:attrNameLst>
-                                      </p:cBhvr>
-                                      <p:tavLst>
-                                        <p:tav tm="0">
-                                          <p:val>
-                                            <p:strVal val="#ppt_x+1"/>
-                                          </p:val>
-                                        </p:tav>
-                                        <p:tav tm="100000">
-                                          <p:val>
-                                            <p:strVal val="#ppt_x"/>
-                                          </p:val>
-                                        </p:tav>
-                                      </p:tavLst>
-                                    </p:anim>
-                                  </p:childTnLst>
-                                </p:cTn>
-                              </p:par>
-                            </p:childTnLst>
-                          </p:cTn>
-                        </p:par>
-                      </p:childTnLst>
-                    </p:cTn>
-                  </p:par>
-                </p:childTnLst>
-              </p:cTn>
-              <p:prevCondLst>
-                <p:cond evt="onPrev" delay="0">
-                  <p:tgtEl>
-                    <p:sldTgt/>
-                  </p:tgtEl>
-                </p:cond>
-              </p:prevCondLst>
-              <p:nextCondLst>
-                <p:cond evt="onNext" delay="0">
-                  <p:tgtEl>
-                    <p:sldTgt/>
-                  </p:tgtEl>
-                </p:cond>
-              </p:nextCondLst>
-            </p:seq>
-          </p:childTnLst>
-        </p:cTn>
-      </p:par>
-    </p:tnLst>
-  </p:timing>
 </p:sld>
 </file>
 
@@ -27110,6 +26427,809 @@
   <p:cSld>
     <p:spTree>
       <p:nvGrpSpPr>
+        <p:cNvPr id="1" name="Shape 300"/>
+        <p:cNvGrpSpPr/>
+        <p:nvPr/>
+      </p:nvGrpSpPr>
+      <p:grpSpPr>
+        <a:xfrm>
+          <a:off x="0" y="0"/>
+          <a:ext cx="0" cy="0"/>
+          <a:chOff x="0" y="0"/>
+          <a:chExt cx="0" cy="0"/>
+        </a:xfrm>
+      </p:grpSpPr>
+      <p:sp>
+        <p:nvSpPr>
+          <p:cNvPr id="301" name="Google Shape;301;g110466c95e2_8_150"/>
+          <p:cNvSpPr txBox="1"/>
+          <p:nvPr/>
+        </p:nvSpPr>
+        <p:spPr>
+          <a:xfrm>
+            <a:off x="2920650" y="1564200"/>
+            <a:ext cx="8412900" cy="4186800"/>
+          </a:xfrm>
+          <a:prstGeom prst="rect">
+            <a:avLst/>
+          </a:prstGeom>
+          <a:noFill/>
+          <a:ln>
+            <a:noFill/>
+          </a:ln>
+        </p:spPr>
+        <p:txBody>
+          <a:bodyPr spcFirstLastPara="1" wrap="square" lIns="91425" tIns="91425" rIns="91425" bIns="91425" anchor="t" anchorCtr="0">
+            <a:spAutoFit/>
+          </a:bodyPr>
+          <a:lstStyle/>
+          <a:p>
+            <a:pPr marL="0" marR="0" lvl="0" indent="0" algn="just" rtl="0">
+              <a:lnSpc>
+                <a:spcPct val="150000"/>
+              </a:lnSpc>
+              <a:spcBef>
+                <a:spcPts val="0"/>
+              </a:spcBef>
+              <a:spcAft>
+                <a:spcPts val="0"/>
+              </a:spcAft>
+              <a:buClr>
+                <a:srgbClr val="000000"/>
+              </a:buClr>
+              <a:buSzPts val="2000"/>
+              <a:buFont typeface="Arial"/>
+              <a:buNone/>
+            </a:pPr>
+            <a:r>
+              <a:rPr lang="en-US" sz="2000" b="0" i="0" u="none" strike="noStrike" cap="none">
+                <a:solidFill>
+                  <a:schemeClr val="dk1"/>
+                </a:solidFill>
+                <a:latin typeface="Roboto Slab"/>
+                <a:ea typeface="Roboto Slab"/>
+                <a:cs typeface="Roboto Slab"/>
+                <a:sym typeface="Roboto Slab"/>
+              </a:rPr>
+              <a:t>Up to now, we have:</a:t>
+            </a:r>
+            <a:endParaRPr sz="2000" b="0" i="0" u="none" strike="noStrike" cap="none">
+              <a:solidFill>
+                <a:schemeClr val="dk1"/>
+              </a:solidFill>
+              <a:latin typeface="Roboto Slab"/>
+              <a:ea typeface="Roboto Slab"/>
+              <a:cs typeface="Roboto Slab"/>
+              <a:sym typeface="Roboto Slab"/>
+            </a:endParaRPr>
+          </a:p>
+          <a:p>
+            <a:pPr marL="457200" marR="0" lvl="0" indent="-355600" algn="just" rtl="0">
+              <a:lnSpc>
+                <a:spcPct val="150000"/>
+              </a:lnSpc>
+              <a:spcBef>
+                <a:spcPts val="0"/>
+              </a:spcBef>
+              <a:spcAft>
+                <a:spcPts val="0"/>
+              </a:spcAft>
+              <a:buClr>
+                <a:schemeClr val="dk1"/>
+              </a:buClr>
+              <a:buSzPts val="2000"/>
+              <a:buFont typeface="Roboto Slab"/>
+              <a:buChar char="★"/>
+            </a:pPr>
+            <a:r>
+              <a:rPr lang="en-US" sz="2000" b="0" i="0" u="none" strike="noStrike" cap="none">
+                <a:solidFill>
+                  <a:schemeClr val="dk1"/>
+                </a:solidFill>
+                <a:latin typeface="Roboto Slab"/>
+                <a:ea typeface="Roboto Slab"/>
+                <a:cs typeface="Roboto Slab"/>
+                <a:sym typeface="Roboto Slab"/>
+              </a:rPr>
+              <a:t>Completed compulsory documents.</a:t>
+            </a:r>
+            <a:endParaRPr sz="2000" b="0" i="0" u="none" strike="noStrike" cap="none">
+              <a:solidFill>
+                <a:schemeClr val="dk1"/>
+              </a:solidFill>
+              <a:latin typeface="Roboto Slab"/>
+              <a:ea typeface="Roboto Slab"/>
+              <a:cs typeface="Roboto Slab"/>
+              <a:sym typeface="Roboto Slab"/>
+            </a:endParaRPr>
+          </a:p>
+          <a:p>
+            <a:pPr marL="457200" marR="0" lvl="0" indent="-355600" algn="just" rtl="0">
+              <a:lnSpc>
+                <a:spcPct val="150000"/>
+              </a:lnSpc>
+              <a:spcBef>
+                <a:spcPts val="0"/>
+              </a:spcBef>
+              <a:spcAft>
+                <a:spcPts val="0"/>
+              </a:spcAft>
+              <a:buClr>
+                <a:schemeClr val="dk1"/>
+              </a:buClr>
+              <a:buSzPts val="2000"/>
+              <a:buFont typeface="Roboto Slab"/>
+              <a:buChar char="★"/>
+            </a:pPr>
+            <a:r>
+              <a:rPr lang="en-US" sz="2000" b="0" i="0" u="none" strike="noStrike" cap="none">
+                <a:solidFill>
+                  <a:schemeClr val="dk1"/>
+                </a:solidFill>
+                <a:latin typeface="Roboto Slab"/>
+                <a:ea typeface="Roboto Slab"/>
+                <a:cs typeface="Roboto Slab"/>
+                <a:sym typeface="Roboto Slab"/>
+              </a:rPr>
+              <a:t>Stock prediction algorithm - LSTM.</a:t>
+            </a:r>
+            <a:endParaRPr sz="2000" b="0" i="0" u="none" strike="noStrike" cap="none">
+              <a:solidFill>
+                <a:schemeClr val="dk1"/>
+              </a:solidFill>
+              <a:latin typeface="Roboto Slab"/>
+              <a:ea typeface="Roboto Slab"/>
+              <a:cs typeface="Roboto Slab"/>
+              <a:sym typeface="Roboto Slab"/>
+            </a:endParaRPr>
+          </a:p>
+          <a:p>
+            <a:pPr marL="457200" marR="0" lvl="0" indent="-355600" algn="just" rtl="0">
+              <a:lnSpc>
+                <a:spcPct val="150000"/>
+              </a:lnSpc>
+              <a:spcBef>
+                <a:spcPts val="0"/>
+              </a:spcBef>
+              <a:spcAft>
+                <a:spcPts val="0"/>
+              </a:spcAft>
+              <a:buClr>
+                <a:schemeClr val="dk1"/>
+              </a:buClr>
+              <a:buSzPts val="2000"/>
+              <a:buFont typeface="Roboto Slab"/>
+              <a:buChar char="★"/>
+            </a:pPr>
+            <a:r>
+              <a:rPr lang="en-US" sz="2000" b="0" i="0" u="none" strike="noStrike" cap="none">
+                <a:solidFill>
+                  <a:schemeClr val="dk1"/>
+                </a:solidFill>
+                <a:latin typeface="Roboto Slab"/>
+                <a:ea typeface="Roboto Slab"/>
+                <a:cs typeface="Roboto Slab"/>
+                <a:sym typeface="Roboto Slab"/>
+              </a:rPr>
+              <a:t>Data to train our model, to display charts and other information in the User Interface.</a:t>
+            </a:r>
+            <a:endParaRPr sz="2000" b="0" i="0" u="none" strike="noStrike" cap="none">
+              <a:solidFill>
+                <a:schemeClr val="dk1"/>
+              </a:solidFill>
+              <a:latin typeface="Roboto Slab"/>
+              <a:ea typeface="Roboto Slab"/>
+              <a:cs typeface="Roboto Slab"/>
+              <a:sym typeface="Roboto Slab"/>
+            </a:endParaRPr>
+          </a:p>
+          <a:p>
+            <a:pPr marL="457200" marR="0" lvl="0" indent="-355600" algn="just" rtl="0">
+              <a:lnSpc>
+                <a:spcPct val="150000"/>
+              </a:lnSpc>
+              <a:spcBef>
+                <a:spcPts val="0"/>
+              </a:spcBef>
+              <a:spcAft>
+                <a:spcPts val="0"/>
+              </a:spcAft>
+              <a:buClr>
+                <a:schemeClr val="dk1"/>
+              </a:buClr>
+              <a:buSzPts val="2000"/>
+              <a:buFont typeface="Roboto Slab"/>
+              <a:buChar char="★"/>
+            </a:pPr>
+            <a:r>
+              <a:rPr lang="en-US" sz="2000" b="0" i="0" u="none" strike="noStrike" cap="none">
+                <a:solidFill>
+                  <a:schemeClr val="dk1"/>
+                </a:solidFill>
+                <a:latin typeface="Roboto Slab"/>
+                <a:ea typeface="Roboto Slab"/>
+                <a:cs typeface="Roboto Slab"/>
+                <a:sym typeface="Roboto Slab"/>
+              </a:rPr>
+              <a:t>MongoDB to store all necessary data.</a:t>
+            </a:r>
+            <a:endParaRPr sz="2000" b="0" i="0" u="none" strike="noStrike" cap="none">
+              <a:solidFill>
+                <a:schemeClr val="dk1"/>
+              </a:solidFill>
+              <a:latin typeface="Roboto Slab"/>
+              <a:ea typeface="Roboto Slab"/>
+              <a:cs typeface="Roboto Slab"/>
+              <a:sym typeface="Roboto Slab"/>
+            </a:endParaRPr>
+          </a:p>
+          <a:p>
+            <a:pPr marL="457200" marR="0" lvl="0" indent="-355600" algn="just" rtl="0">
+              <a:lnSpc>
+                <a:spcPct val="150000"/>
+              </a:lnSpc>
+              <a:spcBef>
+                <a:spcPts val="0"/>
+              </a:spcBef>
+              <a:spcAft>
+                <a:spcPts val="0"/>
+              </a:spcAft>
+              <a:buClr>
+                <a:schemeClr val="dk1"/>
+              </a:buClr>
+              <a:buSzPts val="2000"/>
+              <a:buFont typeface="Roboto Slab"/>
+              <a:buChar char="★"/>
+            </a:pPr>
+            <a:r>
+              <a:rPr lang="en-US" sz="2000" b="0" i="0" u="none" strike="noStrike" cap="none">
+                <a:solidFill>
+                  <a:schemeClr val="dk1"/>
+                </a:solidFill>
+                <a:latin typeface="Roboto Slab"/>
+                <a:ea typeface="Roboto Slab"/>
+                <a:cs typeface="Roboto Slab"/>
+                <a:sym typeface="Roboto Slab"/>
+              </a:rPr>
+              <a:t>A</a:t>
+            </a:r>
+            <a:r>
+              <a:rPr lang="en-US" sz="2000">
+                <a:solidFill>
+                  <a:schemeClr val="dk1"/>
+                </a:solidFill>
+                <a:latin typeface="Roboto Slab"/>
+                <a:ea typeface="Roboto Slab"/>
+                <a:cs typeface="Roboto Slab"/>
+                <a:sym typeface="Roboto Slab"/>
+              </a:rPr>
+              <a:t> website for users to login, add reminder and favorite stock, see stock information, its candlestick chart and predicting line chart, have a comparison with another stock.</a:t>
+            </a:r>
+            <a:endParaRPr sz="2000" b="0" i="0" u="none" strike="noStrike" cap="none">
+              <a:solidFill>
+                <a:schemeClr val="dk1"/>
+              </a:solidFill>
+              <a:latin typeface="Roboto Slab"/>
+              <a:ea typeface="Roboto Slab"/>
+              <a:cs typeface="Roboto Slab"/>
+              <a:sym typeface="Roboto Slab"/>
+            </a:endParaRPr>
+          </a:p>
+        </p:txBody>
+      </p:sp>
+      <p:sp>
+        <p:nvSpPr>
+          <p:cNvPr id="302" name="Google Shape;302;g110466c95e2_8_150"/>
+          <p:cNvSpPr txBox="1"/>
+          <p:nvPr/>
+        </p:nvSpPr>
+        <p:spPr>
+          <a:xfrm>
+            <a:off x="838200" y="300955"/>
+            <a:ext cx="10515600" cy="697500"/>
+          </a:xfrm>
+          <a:prstGeom prst="rect">
+            <a:avLst/>
+          </a:prstGeom>
+          <a:noFill/>
+          <a:ln>
+            <a:noFill/>
+          </a:ln>
+        </p:spPr>
+        <p:txBody>
+          <a:bodyPr spcFirstLastPara="1" wrap="square" lIns="91425" tIns="45700" rIns="91425" bIns="45700" anchor="b" anchorCtr="0">
+            <a:normAutofit/>
+          </a:bodyPr>
+          <a:lstStyle/>
+          <a:p>
+            <a:pPr marL="0" marR="0" lvl="0" indent="0" algn="ctr" rtl="0">
+              <a:lnSpc>
+                <a:spcPct val="90000"/>
+              </a:lnSpc>
+              <a:spcBef>
+                <a:spcPts val="0"/>
+              </a:spcBef>
+              <a:spcAft>
+                <a:spcPts val="0"/>
+              </a:spcAft>
+              <a:buClr>
+                <a:schemeClr val="dk2"/>
+              </a:buClr>
+              <a:buSzPts val="3600"/>
+              <a:buFont typeface="Oswald"/>
+              <a:buNone/>
+            </a:pPr>
+            <a:r>
+              <a:rPr lang="en-US" sz="3600" b="0" i="0" u="none" strike="noStrike" cap="none">
+                <a:solidFill>
+                  <a:schemeClr val="dk2"/>
+                </a:solidFill>
+                <a:latin typeface="Oswald"/>
+                <a:ea typeface="Oswald"/>
+                <a:cs typeface="Oswald"/>
+                <a:sym typeface="Oswald"/>
+              </a:rPr>
+              <a:t>Evaluation</a:t>
+            </a:r>
+            <a:endParaRPr sz="1400" b="0" i="0" u="none" strike="noStrike" cap="none">
+              <a:solidFill>
+                <a:srgbClr val="000000"/>
+              </a:solidFill>
+              <a:latin typeface="Arial"/>
+              <a:ea typeface="Arial"/>
+              <a:cs typeface="Arial"/>
+              <a:sym typeface="Arial"/>
+            </a:endParaRPr>
+          </a:p>
+        </p:txBody>
+      </p:sp>
+      <p:sp>
+        <p:nvSpPr>
+          <p:cNvPr id="303" name="Google Shape;303;g110466c95e2_8_150"/>
+          <p:cNvSpPr/>
+          <p:nvPr/>
+        </p:nvSpPr>
+        <p:spPr>
+          <a:xfrm>
+            <a:off x="0" y="6723529"/>
+            <a:ext cx="12192000" cy="147900"/>
+          </a:xfrm>
+          <a:prstGeom prst="rect">
+            <a:avLst/>
+          </a:prstGeom>
+          <a:blipFill rotWithShape="1">
+            <a:blip r:embed="rId3">
+              <a:alphaModFix/>
+            </a:blip>
+            <a:stretch>
+              <a:fillRect/>
+            </a:stretch>
+          </a:blipFill>
+          <a:ln>
+            <a:noFill/>
+          </a:ln>
+        </p:spPr>
+        <p:txBody>
+          <a:bodyPr spcFirstLastPara="1" wrap="square" lIns="91425" tIns="45700" rIns="91425" bIns="45700" anchor="ctr" anchorCtr="0">
+            <a:noAutofit/>
+          </a:bodyPr>
+          <a:lstStyle/>
+          <a:p>
+            <a:pPr marL="0" marR="0" lvl="0" indent="0" algn="ctr" rtl="0">
+              <a:lnSpc>
+                <a:spcPct val="100000"/>
+              </a:lnSpc>
+              <a:spcBef>
+                <a:spcPts val="0"/>
+              </a:spcBef>
+              <a:spcAft>
+                <a:spcPts val="0"/>
+              </a:spcAft>
+              <a:buClr>
+                <a:srgbClr val="000000"/>
+              </a:buClr>
+              <a:buSzPts val="1800"/>
+              <a:buFont typeface="Arial"/>
+              <a:buNone/>
+            </a:pPr>
+            <a:endParaRPr sz="1800" b="0" i="0" u="none" strike="noStrike" cap="none">
+              <a:solidFill>
+                <a:schemeClr val="lt1"/>
+              </a:solidFill>
+              <a:latin typeface="Calibri"/>
+              <a:ea typeface="Calibri"/>
+              <a:cs typeface="Calibri"/>
+              <a:sym typeface="Calibri"/>
+            </a:endParaRPr>
+          </a:p>
+        </p:txBody>
+      </p:sp>
+      <p:cxnSp>
+        <p:nvCxnSpPr>
+          <p:cNvPr id="304" name="Google Shape;304;g110466c95e2_8_150"/>
+          <p:cNvCxnSpPr/>
+          <p:nvPr/>
+        </p:nvCxnSpPr>
+        <p:spPr>
+          <a:xfrm>
+            <a:off x="4066284" y="998590"/>
+            <a:ext cx="4058700" cy="0"/>
+          </a:xfrm>
+          <a:prstGeom prst="straightConnector1">
+            <a:avLst/>
+          </a:prstGeom>
+          <a:noFill/>
+          <a:ln w="28575" cap="flat" cmpd="sng">
+            <a:solidFill>
+              <a:srgbClr val="0081AB"/>
+            </a:solidFill>
+            <a:prstDash val="solid"/>
+            <a:miter lim="800000"/>
+            <a:headEnd type="none" w="sm" len="sm"/>
+            <a:tailEnd type="none" w="sm" len="sm"/>
+          </a:ln>
+        </p:spPr>
+      </p:cxnSp>
+      <p:sp>
+        <p:nvSpPr>
+          <p:cNvPr id="305" name="Google Shape;305;g110466c95e2_8_150"/>
+          <p:cNvSpPr/>
+          <p:nvPr/>
+        </p:nvSpPr>
+        <p:spPr>
+          <a:xfrm>
+            <a:off x="11436822" y="324793"/>
+            <a:ext cx="477300" cy="328200"/>
+          </a:xfrm>
+          <a:prstGeom prst="roundRect">
+            <a:avLst>
+              <a:gd name="adj" fmla="val 16667"/>
+            </a:avLst>
+          </a:prstGeom>
+          <a:solidFill>
+            <a:schemeClr val="lt2"/>
+          </a:solidFill>
+          <a:ln w="38100" cap="flat" cmpd="sng">
+            <a:solidFill>
+              <a:srgbClr val="D5DBE5"/>
+            </a:solidFill>
+            <a:prstDash val="solid"/>
+            <a:miter lim="800000"/>
+            <a:headEnd type="none" w="sm" len="sm"/>
+            <a:tailEnd type="none" w="sm" len="sm"/>
+          </a:ln>
+        </p:spPr>
+        <p:txBody>
+          <a:bodyPr spcFirstLastPara="1" wrap="square" lIns="91425" tIns="45700" rIns="91425" bIns="45700" anchor="ctr" anchorCtr="0">
+            <a:noAutofit/>
+          </a:bodyPr>
+          <a:lstStyle/>
+          <a:p>
+            <a:pPr marL="0" marR="0" lvl="0" indent="0" algn="ctr" rtl="0">
+              <a:lnSpc>
+                <a:spcPct val="100000"/>
+              </a:lnSpc>
+              <a:spcBef>
+                <a:spcPts val="0"/>
+              </a:spcBef>
+              <a:spcAft>
+                <a:spcPts val="0"/>
+              </a:spcAft>
+              <a:buClr>
+                <a:schemeClr val="lt1"/>
+              </a:buClr>
+              <a:buSzPts val="1200"/>
+              <a:buFont typeface="Calibri"/>
+              <a:buNone/>
+            </a:pPr>
+            <a:endParaRPr sz="1200" b="0" i="0" u="none" strike="noStrike" cap="none">
+              <a:solidFill>
+                <a:schemeClr val="lt1"/>
+              </a:solidFill>
+              <a:latin typeface="Calibri"/>
+              <a:ea typeface="Calibri"/>
+              <a:cs typeface="Calibri"/>
+              <a:sym typeface="Calibri"/>
+            </a:endParaRPr>
+          </a:p>
+        </p:txBody>
+      </p:sp>
+      <p:sp>
+        <p:nvSpPr>
+          <p:cNvPr id="306" name="Google Shape;306;g110466c95e2_8_150"/>
+          <p:cNvSpPr txBox="1"/>
+          <p:nvPr/>
+        </p:nvSpPr>
+        <p:spPr>
+          <a:xfrm>
+            <a:off x="11333546" y="306325"/>
+            <a:ext cx="543600" cy="365100"/>
+          </a:xfrm>
+          <a:prstGeom prst="rect">
+            <a:avLst/>
+          </a:prstGeom>
+          <a:noFill/>
+          <a:ln>
+            <a:noFill/>
+          </a:ln>
+        </p:spPr>
+        <p:txBody>
+          <a:bodyPr spcFirstLastPara="1" wrap="square" lIns="91425" tIns="45700" rIns="91425" bIns="45700" anchor="ctr" anchorCtr="0">
+            <a:noAutofit/>
+          </a:bodyPr>
+          <a:lstStyle/>
+          <a:p>
+            <a:pPr marL="0" marR="0" lvl="0" indent="0" algn="r" rtl="0">
+              <a:lnSpc>
+                <a:spcPct val="100000"/>
+              </a:lnSpc>
+              <a:spcBef>
+                <a:spcPts val="0"/>
+              </a:spcBef>
+              <a:spcAft>
+                <a:spcPts val="0"/>
+              </a:spcAft>
+              <a:buClr>
+                <a:srgbClr val="000000"/>
+              </a:buClr>
+              <a:buSzPts val="1500"/>
+              <a:buFont typeface="Arial"/>
+              <a:buNone/>
+            </a:pPr>
+            <a:r>
+              <a:rPr lang="en-US" sz="1500" b="1">
+                <a:solidFill>
+                  <a:srgbClr val="003A5F"/>
+                </a:solidFill>
+                <a:latin typeface="Roboto Slab"/>
+                <a:ea typeface="Roboto Slab"/>
+                <a:cs typeface="Roboto Slab"/>
+                <a:sym typeface="Roboto Slab"/>
+              </a:rPr>
+              <a:t>17</a:t>
+            </a:r>
+            <a:endParaRPr sz="1500" b="1" i="0" u="none" strike="noStrike" cap="none">
+              <a:solidFill>
+                <a:srgbClr val="003A5F"/>
+              </a:solidFill>
+              <a:latin typeface="Roboto Slab"/>
+              <a:ea typeface="Roboto Slab"/>
+              <a:cs typeface="Roboto Slab"/>
+              <a:sym typeface="Roboto Slab"/>
+            </a:endParaRPr>
+          </a:p>
+        </p:txBody>
+      </p:sp>
+      <p:pic>
+        <p:nvPicPr>
+          <p:cNvPr id="307" name="Google Shape;307;g110466c95e2_8_150"/>
+          <p:cNvPicPr preferRelativeResize="0"/>
+          <p:nvPr/>
+        </p:nvPicPr>
+        <p:blipFill rotWithShape="1">
+          <a:blip r:embed="rId4">
+            <a:alphaModFix/>
+          </a:blip>
+          <a:srcRect/>
+          <a:stretch/>
+        </p:blipFill>
+        <p:spPr>
+          <a:xfrm>
+            <a:off x="1229575" y="1797000"/>
+            <a:ext cx="1446400" cy="1446400"/>
+          </a:xfrm>
+          <a:prstGeom prst="rect">
+            <a:avLst/>
+          </a:prstGeom>
+          <a:noFill/>
+          <a:ln>
+            <a:noFill/>
+          </a:ln>
+        </p:spPr>
+      </p:pic>
+      <p:sp>
+        <p:nvSpPr>
+          <p:cNvPr id="308" name="Google Shape;308;g110466c95e2_8_150"/>
+          <p:cNvSpPr txBox="1"/>
+          <p:nvPr/>
+        </p:nvSpPr>
+        <p:spPr>
+          <a:xfrm>
+            <a:off x="2991525" y="1977500"/>
+            <a:ext cx="7996500" cy="400200"/>
+          </a:xfrm>
+          <a:prstGeom prst="rect">
+            <a:avLst/>
+          </a:prstGeom>
+          <a:noFill/>
+          <a:ln>
+            <a:noFill/>
+          </a:ln>
+        </p:spPr>
+        <p:txBody>
+          <a:bodyPr spcFirstLastPara="1" wrap="square" lIns="91425" tIns="91425" rIns="91425" bIns="91425" anchor="t" anchorCtr="0">
+            <a:spAutoFit/>
+          </a:bodyPr>
+          <a:lstStyle/>
+          <a:p>
+            <a:pPr marL="0" marR="0" lvl="0" indent="0" algn="l" rtl="0">
+              <a:lnSpc>
+                <a:spcPct val="100000"/>
+              </a:lnSpc>
+              <a:spcBef>
+                <a:spcPts val="0"/>
+              </a:spcBef>
+              <a:spcAft>
+                <a:spcPts val="0"/>
+              </a:spcAft>
+              <a:buClr>
+                <a:srgbClr val="000000"/>
+              </a:buClr>
+              <a:buSzPts val="1400"/>
+              <a:buFont typeface="Arial"/>
+              <a:buNone/>
+            </a:pPr>
+            <a:endParaRPr sz="1400" b="0" i="0" u="none" strike="noStrike" cap="none">
+              <a:solidFill>
+                <a:srgbClr val="000000"/>
+              </a:solidFill>
+              <a:latin typeface="Calibri"/>
+              <a:ea typeface="Calibri"/>
+              <a:cs typeface="Calibri"/>
+              <a:sym typeface="Calibri"/>
+            </a:endParaRPr>
+          </a:p>
+        </p:txBody>
+      </p:sp>
+    </p:spTree>
+  </p:cSld>
+  <p:clrMapOvr>
+    <a:masterClrMapping/>
+  </p:clrMapOvr>
+  <p:timing>
+    <p:tnLst>
+      <p:par>
+        <p:cTn id="1" dur="indefinite" restart="never" nodeType="tmRoot">
+          <p:childTnLst>
+            <p:seq concurrent="1" nextAc="seek">
+              <p:cTn id="2" dur="indefinite" nodeType="mainSeq">
+                <p:childTnLst>
+                  <p:par>
+                    <p:cTn id="3" fill="hold">
+                      <p:stCondLst>
+                        <p:cond delay="indefinite"/>
+                        <p:cond evt="onBegin" delay="0">
+                          <p:tn val="2"/>
+                        </p:cond>
+                      </p:stCondLst>
+                      <p:childTnLst>
+                        <p:par>
+                          <p:cTn id="4" fill="hold">
+                            <p:stCondLst>
+                              <p:cond delay="0"/>
+                            </p:stCondLst>
+                            <p:childTnLst>
+                              <p:par>
+                                <p:cTn id="5" presetID="10" presetClass="entr" presetSubtype="0" fill="hold" nodeType="withEffect">
+                                  <p:stCondLst>
+                                    <p:cond delay="0"/>
+                                  </p:stCondLst>
+                                  <p:childTnLst>
+                                    <p:set>
+                                      <p:cBhvr>
+                                        <p:cTn id="6" dur="1" fill="hold">
+                                          <p:stCondLst>
+                                            <p:cond delay="0"/>
+                                          </p:stCondLst>
+                                        </p:cTn>
+                                        <p:tgtEl>
+                                          <p:spTgt spid="302"/>
+                                        </p:tgtEl>
+                                        <p:attrNameLst>
+                                          <p:attrName>style.visibility</p:attrName>
+                                        </p:attrNameLst>
+                                      </p:cBhvr>
+                                      <p:to>
+                                        <p:strVal val="visible"/>
+                                      </p:to>
+                                    </p:set>
+                                    <p:animEffect transition="in" filter="fade">
+                                      <p:cBhvr>
+                                        <p:cTn id="7" dur="1700"/>
+                                        <p:tgtEl>
+                                          <p:spTgt spid="302"/>
+                                        </p:tgtEl>
+                                      </p:cBhvr>
+                                    </p:animEffect>
+                                  </p:childTnLst>
+                                </p:cTn>
+                              </p:par>
+                              <p:par>
+                                <p:cTn id="8" presetID="2" presetClass="entr" presetSubtype="2" fill="hold" nodeType="withEffect">
+                                  <p:stCondLst>
+                                    <p:cond delay="0"/>
+                                  </p:stCondLst>
+                                  <p:childTnLst>
+                                    <p:set>
+                                      <p:cBhvr>
+                                        <p:cTn id="9" dur="1" fill="hold">
+                                          <p:stCondLst>
+                                            <p:cond delay="0"/>
+                                          </p:stCondLst>
+                                        </p:cTn>
+                                        <p:tgtEl>
+                                          <p:spTgt spid="304"/>
+                                        </p:tgtEl>
+                                        <p:attrNameLst>
+                                          <p:attrName>style.visibility</p:attrName>
+                                        </p:attrNameLst>
+                                      </p:cBhvr>
+                                      <p:to>
+                                        <p:strVal val="visible"/>
+                                      </p:to>
+                                    </p:set>
+                                    <p:anim calcmode="lin" valueType="num">
+                                      <p:cBhvr additive="base">
+                                        <p:cTn id="10" dur="500"/>
+                                        <p:tgtEl>
+                                          <p:spTgt spid="304"/>
+                                        </p:tgtEl>
+                                        <p:attrNameLst>
+                                          <p:attrName>ppt_x</p:attrName>
+                                        </p:attrNameLst>
+                                      </p:cBhvr>
+                                      <p:tavLst>
+                                        <p:tav tm="0">
+                                          <p:val>
+                                            <p:strVal val="#ppt_x+1"/>
+                                          </p:val>
+                                        </p:tav>
+                                        <p:tav tm="100000">
+                                          <p:val>
+                                            <p:strVal val="#ppt_x"/>
+                                          </p:val>
+                                        </p:tav>
+                                      </p:tavLst>
+                                    </p:anim>
+                                  </p:childTnLst>
+                                </p:cTn>
+                              </p:par>
+                            </p:childTnLst>
+                          </p:cTn>
+                        </p:par>
+                      </p:childTnLst>
+                    </p:cTn>
+                  </p:par>
+                </p:childTnLst>
+              </p:cTn>
+              <p:prevCondLst>
+                <p:cond evt="onPrev" delay="0">
+                  <p:tgtEl>
+                    <p:sldTgt/>
+                  </p:tgtEl>
+                </p:cond>
+              </p:prevCondLst>
+              <p:nextCondLst>
+                <p:cond evt="onNext" delay="0">
+                  <p:tgtEl>
+                    <p:sldTgt/>
+                  </p:tgtEl>
+                </p:cond>
+              </p:nextCondLst>
+            </p:seq>
+          </p:childTnLst>
+        </p:cTn>
+      </p:par>
+    </p:tnLst>
+  </p:timing>
+</p:sld>
+</file>
+
+<file path=ppt/slides/slide21.xml><?xml version="1.0" encoding="utf-8"?>
+<p:sld xmlns:a="http://schemas.openxmlformats.org/drawingml/2006/main" xmlns:r="http://schemas.openxmlformats.org/officeDocument/2006/relationships" xmlns:p="http://schemas.openxmlformats.org/presentationml/2006/main">
+  <p:cSld>
+    <p:spTree>
+      <p:nvGrpSpPr>
         <p:cNvPr id="1" name="Shape 312"/>
         <p:cNvGrpSpPr/>
         <p:nvPr/>
@@ -27666,7 +27786,7 @@
 </p:sld>
 </file>
 
-<file path=ppt/slides/slide21.xml><?xml version="1.0" encoding="utf-8"?>
+<file path=ppt/slides/slide22.xml><?xml version="1.0" encoding="utf-8"?>
 <p:sld xmlns:a="http://schemas.openxmlformats.org/drawingml/2006/main" xmlns:r="http://schemas.openxmlformats.org/officeDocument/2006/relationships" xmlns:p="http://schemas.openxmlformats.org/presentationml/2006/main">
   <p:cSld>
     <p:spTree>
@@ -28393,7 +28513,7 @@
 </p:sld>
 </file>
 
-<file path=ppt/slides/slide22.xml><?xml version="1.0" encoding="utf-8"?>
+<file path=ppt/slides/slide23.xml><?xml version="1.0" encoding="utf-8"?>
 <p:sld xmlns:a="http://schemas.openxmlformats.org/drawingml/2006/main" xmlns:r="http://schemas.openxmlformats.org/officeDocument/2006/relationships" xmlns:p="http://schemas.openxmlformats.org/presentationml/2006/main">
   <p:cSld>
     <p:spTree>
@@ -29765,7 +29885,7 @@
 </p:sld>
 </file>
 
-<file path=ppt/slides/slide23.xml><?xml version="1.0" encoding="utf-8"?>
+<file path=ppt/slides/slide24.xml><?xml version="1.0" encoding="utf-8"?>
 <p:sld xmlns:a="http://schemas.openxmlformats.org/drawingml/2006/main" xmlns:r="http://schemas.openxmlformats.org/officeDocument/2006/relationships" xmlns:p="http://schemas.openxmlformats.org/presentationml/2006/main">
   <p:cSld>
     <p:spTree>
@@ -30262,7 +30382,7 @@
 </p:sld>
 </file>
 
-<file path=ppt/slides/slide24.xml><?xml version="1.0" encoding="utf-8"?>
+<file path=ppt/slides/slide25.xml><?xml version="1.0" encoding="utf-8"?>
 <p:sld xmlns:a="http://schemas.openxmlformats.org/drawingml/2006/main" xmlns:r="http://schemas.openxmlformats.org/officeDocument/2006/relationships" xmlns:p="http://schemas.openxmlformats.org/presentationml/2006/main">
   <p:cSld>
     <p:bg>

</xml_diff>